<commit_message>
Doku und Präsentation bearbeitet
</commit_message>
<xml_diff>
--- a/Doku/Dokumentation/Präsentation/Präsentation1.pptx
+++ b/Doku/Dokumentation/Präsentation/Präsentation1.pptx
@@ -5,10 +5,10 @@
     <p:sldMasterId id="2147483648" r:id="rId1"/>
   </p:sldMasterIdLst>
   <p:notesMasterIdLst>
-    <p:notesMasterId r:id="rId9"/>
+    <p:notesMasterId r:id="rId10"/>
   </p:notesMasterIdLst>
   <p:handoutMasterIdLst>
-    <p:handoutMasterId r:id="rId10"/>
+    <p:handoutMasterId r:id="rId11"/>
   </p:handoutMasterIdLst>
   <p:sldIdLst>
     <p:sldId id="256" r:id="rId2"/>
@@ -18,6 +18,7 @@
     <p:sldId id="260" r:id="rId6"/>
     <p:sldId id="261" r:id="rId7"/>
     <p:sldId id="262" r:id="rId8"/>
+    <p:sldId id="263" r:id="rId9"/>
   </p:sldIdLst>
   <p:sldSz cx="9144000" cy="6858000" type="screen4x3"/>
   <p:notesSz cx="6858000" cy="9144000"/>
@@ -201,7 +202,7 @@
           <a:p>
             <a:fld id="{3C5C1F87-A553-D54A-8D92-982D0D8B1973}" type="datetime1">
               <a:rPr lang="de-DE" smtClean="0"/>
-              <a:t>22.07.15</a:t>
+              <a:t>28.07.15</a:t>
             </a:fld>
             <a:endParaRPr lang="de-DE"/>
           </a:p>
@@ -367,7 +368,7 @@
           <a:p>
             <a:fld id="{5EBEB032-4C8F-D14A-8C9D-7EF290BC175F}" type="datetime1">
               <a:rPr lang="de-DE" smtClean="0"/>
-              <a:t>22.07.15</a:t>
+              <a:t>28.07.15</a:t>
             </a:fld>
             <a:endParaRPr lang="de-DE"/>
           </a:p>
@@ -1140,6 +1141,90 @@
 </p:notes>
 </file>
 
+<file path=ppt/notesSlides/notesSlide7.xml><?xml version="1.0" encoding="utf-8"?>
+<p:notes xmlns:a="http://schemas.openxmlformats.org/drawingml/2006/main" xmlns:r="http://schemas.openxmlformats.org/officeDocument/2006/relationships" xmlns:p="http://schemas.openxmlformats.org/presentationml/2006/main">
+  <p:cSld>
+    <p:spTree>
+      <p:nvGrpSpPr>
+        <p:cNvPr id="1" name=""/>
+        <p:cNvGrpSpPr/>
+        <p:nvPr/>
+      </p:nvGrpSpPr>
+      <p:grpSpPr>
+        <a:xfrm>
+          <a:off x="0" y="0"/>
+          <a:ext cx="0" cy="0"/>
+          <a:chOff x="0" y="0"/>
+          <a:chExt cx="0" cy="0"/>
+        </a:xfrm>
+      </p:grpSpPr>
+      <p:sp>
+        <p:nvSpPr>
+          <p:cNvPr id="2" name="Folienbildplatzhalter 1"/>
+          <p:cNvSpPr>
+            <a:spLocks noGrp="1" noRot="1" noChangeAspect="1"/>
+          </p:cNvSpPr>
+          <p:nvPr>
+            <p:ph type="sldImg"/>
+          </p:nvPr>
+        </p:nvSpPr>
+        <p:spPr/>
+      </p:sp>
+      <p:sp>
+        <p:nvSpPr>
+          <p:cNvPr id="3" name="Notizenplatzhalter 2"/>
+          <p:cNvSpPr>
+            <a:spLocks noGrp="1"/>
+          </p:cNvSpPr>
+          <p:nvPr>
+            <p:ph type="body" idx="1"/>
+          </p:nvPr>
+        </p:nvSpPr>
+        <p:spPr/>
+        <p:txBody>
+          <a:bodyPr/>
+          <a:lstStyle/>
+          <a:p>
+            <a:endParaRPr lang="de-DE"/>
+          </a:p>
+        </p:txBody>
+      </p:sp>
+      <p:sp>
+        <p:nvSpPr>
+          <p:cNvPr id="4" name="Foliennummernplatzhalter 3"/>
+          <p:cNvSpPr>
+            <a:spLocks noGrp="1"/>
+          </p:cNvSpPr>
+          <p:nvPr>
+            <p:ph type="sldNum" sz="quarter" idx="10"/>
+          </p:nvPr>
+        </p:nvSpPr>
+        <p:spPr/>
+        <p:txBody>
+          <a:bodyPr/>
+          <a:lstStyle/>
+          <a:p>
+            <a:fld id="{3C8D0F26-E54A-6B4C-9639-65B577CA5DAC}" type="slidenum">
+              <a:rPr lang="de-DE" smtClean="0"/>
+              <a:t>8</a:t>
+            </a:fld>
+            <a:endParaRPr lang="de-DE"/>
+          </a:p>
+        </p:txBody>
+      </p:sp>
+    </p:spTree>
+    <p:extLst>
+      <p:ext uri="{BB962C8B-B14F-4D97-AF65-F5344CB8AC3E}">
+        <p14:creationId xmlns:p14="http://schemas.microsoft.com/office/powerpoint/2010/main" val="2472944022"/>
+      </p:ext>
+    </p:extLst>
+  </p:cSld>
+  <p:clrMapOvr>
+    <a:masterClrMapping/>
+  </p:clrMapOvr>
+</p:notes>
+</file>
+
 <file path=ppt/slideLayouts/slideLayout1.xml><?xml version="1.0" encoding="utf-8"?>
 <p:sldLayout xmlns:a="http://schemas.openxmlformats.org/drawingml/2006/main" xmlns:r="http://schemas.openxmlformats.org/officeDocument/2006/relationships" xmlns:p="http://schemas.openxmlformats.org/presentationml/2006/main" type="title" preserve="1">
   <p:cSld name="Titelfolie">
@@ -1321,7 +1406,7 @@
           <a:p>
             <a:fld id="{1C409EFA-92D1-2F45-84E5-8C09624895D8}" type="datetime1">
               <a:rPr lang="de-DE" smtClean="0"/>
-              <a:t>22.07.15</a:t>
+              <a:t>28.07.15</a:t>
             </a:fld>
             <a:endParaRPr lang="de-DE"/>
           </a:p>
@@ -1491,7 +1576,7 @@
           <a:p>
             <a:fld id="{CC9C6B11-0577-8246-A3BA-B300B0F499A5}" type="datetime1">
               <a:rPr lang="de-DE" smtClean="0"/>
-              <a:t>22.07.15</a:t>
+              <a:t>28.07.15</a:t>
             </a:fld>
             <a:endParaRPr lang="de-DE"/>
           </a:p>
@@ -1671,7 +1756,7 @@
           <a:p>
             <a:fld id="{6902ABF9-E8A2-8E4D-B50D-9137CB1F6782}" type="datetime1">
               <a:rPr lang="de-DE" smtClean="0"/>
-              <a:t>22.07.15</a:t>
+              <a:t>28.07.15</a:t>
             </a:fld>
             <a:endParaRPr lang="de-DE"/>
           </a:p>
@@ -1841,7 +1926,7 @@
           <a:p>
             <a:fld id="{A2C708EA-969E-8C41-86B2-F6AEDE275753}" type="datetime1">
               <a:rPr lang="de-DE" smtClean="0"/>
-              <a:t>22.07.15</a:t>
+              <a:t>28.07.15</a:t>
             </a:fld>
             <a:endParaRPr lang="de-DE"/>
           </a:p>
@@ -2087,7 +2172,7 @@
           <a:p>
             <a:fld id="{AEAE3140-3677-294F-BB1A-0172ED5847FC}" type="datetime1">
               <a:rPr lang="de-DE" smtClean="0"/>
-              <a:t>22.07.15</a:t>
+              <a:t>28.07.15</a:t>
             </a:fld>
             <a:endParaRPr lang="de-DE"/>
           </a:p>
@@ -2375,7 +2460,7 @@
           <a:p>
             <a:fld id="{1ACAACC3-F3C9-824E-B495-1FDE64EF99BD}" type="datetime1">
               <a:rPr lang="de-DE" smtClean="0"/>
-              <a:t>22.07.15</a:t>
+              <a:t>28.07.15</a:t>
             </a:fld>
             <a:endParaRPr lang="de-DE"/>
           </a:p>
@@ -2797,7 +2882,7 @@
           <a:p>
             <a:fld id="{71DB1126-796D-D447-B9E8-151D005B0148}" type="datetime1">
               <a:rPr lang="de-DE" smtClean="0"/>
-              <a:t>22.07.15</a:t>
+              <a:t>28.07.15</a:t>
             </a:fld>
             <a:endParaRPr lang="de-DE"/>
           </a:p>
@@ -2915,7 +3000,7 @@
           <a:p>
             <a:fld id="{4CF1641E-36A7-7A48-BECA-119086F567EF}" type="datetime1">
               <a:rPr lang="de-DE" smtClean="0"/>
-              <a:t>22.07.15</a:t>
+              <a:t>28.07.15</a:t>
             </a:fld>
             <a:endParaRPr lang="de-DE"/>
           </a:p>
@@ -3010,7 +3095,7 @@
           <a:p>
             <a:fld id="{35F65FC4-9A5E-7749-B2FE-88A153ECB593}" type="datetime1">
               <a:rPr lang="de-DE" smtClean="0"/>
-              <a:t>22.07.15</a:t>
+              <a:t>28.07.15</a:t>
             </a:fld>
             <a:endParaRPr lang="de-DE"/>
           </a:p>
@@ -3287,7 +3372,7 @@
           <a:p>
             <a:fld id="{B03973DD-0E77-DA46-B1C6-B169DCECB667}" type="datetime1">
               <a:rPr lang="de-DE" smtClean="0"/>
-              <a:t>22.07.15</a:t>
+              <a:t>28.07.15</a:t>
             </a:fld>
             <a:endParaRPr lang="de-DE"/>
           </a:p>
@@ -3540,7 +3625,7 @@
           <a:p>
             <a:fld id="{FDA4983A-5DE4-D64A-9ECF-D3D9C6C15267}" type="datetime1">
               <a:rPr lang="de-DE" smtClean="0"/>
-              <a:t>22.07.15</a:t>
+              <a:t>28.07.15</a:t>
             </a:fld>
             <a:endParaRPr lang="de-DE"/>
           </a:p>
@@ -3753,7 +3838,7 @@
           <a:p>
             <a:fld id="{999BCF29-3F8F-2D4D-85F8-AC23766BD627}" type="datetime1">
               <a:rPr lang="de-DE" smtClean="0"/>
-              <a:t>22.07.15</a:t>
+              <a:t>28.07.15</a:t>
             </a:fld>
             <a:endParaRPr lang="de-DE"/>
           </a:p>
@@ -4839,7 +4924,7 @@
                 <a:latin typeface="Helvetica"/>
                 <a:cs typeface="Helvetica"/>
               </a:rPr>
-              <a:t>Gliederung</a:t>
+              <a:t>Anforderungen</a:t>
             </a:r>
             <a:endParaRPr lang="de-DE" sz="2800" dirty="0">
               <a:latin typeface="Helvetica"/>
@@ -4856,8 +4941,8 @@
         </p:nvSpPr>
         <p:spPr>
           <a:xfrm>
-            <a:off x="250158" y="972764"/>
-            <a:ext cx="8695409" cy="369332"/>
+            <a:off x="250158" y="1800246"/>
+            <a:ext cx="8695409" cy="2308324"/>
           </a:xfrm>
           <a:prstGeom prst="rect">
             <a:avLst/>
@@ -4870,12 +4955,109 @@
           </a:bodyPr>
           <a:lstStyle/>
           <a:p>
-            <a:r>
-              <a:rPr lang="de-DE" dirty="0" smtClean="0">
+            <a:pPr marL="285750" indent="-285750">
+              <a:buFont typeface="Arial"/>
+              <a:buChar char="•"/>
+            </a:pPr>
+            <a:r>
+              <a:rPr lang="de-DE" sz="2400" dirty="0" smtClean="0">
                 <a:latin typeface="Helvetica"/>
                 <a:cs typeface="Helvetica"/>
               </a:rPr>
-              <a:t>Inhalt</a:t>
+              <a:t>Serverseitige Webanwendung</a:t>
+            </a:r>
+          </a:p>
+          <a:p>
+            <a:pPr marL="285750" indent="-285750">
+              <a:buFont typeface="Arial"/>
+              <a:buChar char="•"/>
+            </a:pPr>
+            <a:r>
+              <a:rPr lang="de-DE" sz="2400" dirty="0" smtClean="0">
+                <a:latin typeface="Helvetica"/>
+                <a:cs typeface="Helvetica"/>
+              </a:rPr>
+              <a:t>Autovermietung</a:t>
+            </a:r>
+          </a:p>
+          <a:p>
+            <a:pPr marL="285750" indent="-285750">
+              <a:buFont typeface="Arial"/>
+              <a:buChar char="•"/>
+            </a:pPr>
+            <a:r>
+              <a:rPr lang="de-DE" sz="2400" dirty="0" smtClean="0">
+                <a:latin typeface="Helvetica"/>
+                <a:cs typeface="Helvetica"/>
+              </a:rPr>
+              <a:t>Relationalen Datenbank</a:t>
+            </a:r>
+            <a:endParaRPr lang="de-DE" sz="2400" dirty="0">
+              <a:latin typeface="Helvetica"/>
+              <a:cs typeface="Helvetica"/>
+            </a:endParaRPr>
+          </a:p>
+          <a:p>
+            <a:pPr marL="285750" indent="-285750">
+              <a:buFont typeface="Arial"/>
+              <a:buChar char="•"/>
+            </a:pPr>
+            <a:r>
+              <a:rPr lang="de-DE" sz="2400" dirty="0" smtClean="0">
+                <a:latin typeface="Helvetica"/>
+                <a:cs typeface="Helvetica"/>
+              </a:rPr>
+              <a:t>DBMS </a:t>
+            </a:r>
+            <a:r>
+              <a:rPr lang="de-DE" sz="2400" dirty="0" smtClean="0">
+                <a:latin typeface="Helvetica"/>
+                <a:cs typeface="Helvetica"/>
+                <a:sym typeface="Wingdings"/>
+              </a:rPr>
+              <a:t> </a:t>
+            </a:r>
+            <a:r>
+              <a:rPr lang="de-DE" sz="2400" dirty="0" smtClean="0">
+                <a:latin typeface="Helvetica"/>
+                <a:cs typeface="Helvetica"/>
+              </a:rPr>
+              <a:t>MySQL</a:t>
+            </a:r>
+          </a:p>
+          <a:p>
+            <a:pPr marL="285750" indent="-285750">
+              <a:buFont typeface="Arial"/>
+              <a:buChar char="•"/>
+            </a:pPr>
+            <a:r>
+              <a:rPr lang="de-DE" sz="2400" dirty="0" smtClean="0">
+                <a:latin typeface="Helvetica"/>
+                <a:cs typeface="Helvetica"/>
+              </a:rPr>
+              <a:t>Logik </a:t>
+            </a:r>
+            <a:r>
+              <a:rPr lang="de-DE" sz="2400" dirty="0" smtClean="0">
+                <a:latin typeface="Helvetica"/>
+                <a:cs typeface="Helvetica"/>
+                <a:sym typeface="Wingdings"/>
+              </a:rPr>
+              <a:t> Java</a:t>
+            </a:r>
+          </a:p>
+          <a:p>
+            <a:pPr marL="285750" indent="-285750">
+              <a:buFont typeface="Arial"/>
+              <a:buChar char="•"/>
+            </a:pPr>
+            <a:r>
+              <a:rPr lang="de-DE" sz="2400" dirty="0" smtClean="0">
+                <a:latin typeface="Helvetica"/>
+                <a:cs typeface="Helvetica"/>
+                <a:sym typeface="Wingdings"/>
+              </a:rPr>
+              <a:t>Frontend  JSP mit Bootstrap</a:t>
             </a:r>
           </a:p>
         </p:txBody>
@@ -5090,11 +5272,11 @@
           <a:lstStyle/>
           <a:p>
             <a:r>
-              <a:rPr lang="de-DE" sz="2800" dirty="0" smtClean="0">
+              <a:rPr lang="de-DE" sz="2800" dirty="0" err="1" smtClean="0">
                 <a:latin typeface="Helvetica"/>
                 <a:cs typeface="Helvetica"/>
               </a:rPr>
-              <a:t>Gliederung</a:t>
+              <a:t>Anwenungsfälle</a:t>
             </a:r>
             <a:endParaRPr lang="de-DE" sz="2800" dirty="0">
               <a:latin typeface="Helvetica"/>
@@ -5103,38 +5285,36 @@
           </a:p>
         </p:txBody>
       </p:sp>
-      <p:sp>
-        <p:nvSpPr>
-          <p:cNvPr id="13" name="Textfeld 12"/>
-          <p:cNvSpPr txBox="1"/>
+      <p:pic>
+        <p:nvPicPr>
+          <p:cNvPr id="6" name="Bild 5" descr="Umgesetzte Anforderungen.jpg"/>
+          <p:cNvPicPr>
+            <a:picLocks noChangeAspect="1"/>
+          </p:cNvPicPr>
           <p:nvPr/>
-        </p:nvSpPr>
-        <p:spPr>
-          <a:xfrm>
-            <a:off x="250158" y="972764"/>
-            <a:ext cx="8695409" cy="369332"/>
+        </p:nvPicPr>
+        <p:blipFill>
+          <a:blip r:embed="rId4">
+            <a:extLst>
+              <a:ext uri="{28A0092B-C50C-407E-A947-70E740481C1C}">
+                <a14:useLocalDpi xmlns:a14="http://schemas.microsoft.com/office/drawing/2010/main" val="0"/>
+              </a:ext>
+            </a:extLst>
+          </a:blip>
+          <a:stretch>
+            <a:fillRect/>
+          </a:stretch>
+        </p:blipFill>
+        <p:spPr>
+          <a:xfrm>
+            <a:off x="452207" y="1040118"/>
+            <a:ext cx="8226353" cy="5406547"/>
           </a:xfrm>
           <a:prstGeom prst="rect">
             <a:avLst/>
           </a:prstGeom>
-          <a:noFill/>
-        </p:spPr>
-        <p:txBody>
-          <a:bodyPr wrap="square" rtlCol="0">
-            <a:spAutoFit/>
-          </a:bodyPr>
-          <a:lstStyle/>
-          <a:p>
-            <a:r>
-              <a:rPr lang="de-DE" dirty="0" smtClean="0">
-                <a:latin typeface="Helvetica"/>
-                <a:cs typeface="Helvetica"/>
-              </a:rPr>
-              <a:t>Inhalt</a:t>
-            </a:r>
-          </a:p>
-        </p:txBody>
-      </p:sp>
+        </p:spPr>
+      </p:pic>
     </p:spTree>
     <p:extLst>
       <p:ext uri="{BB962C8B-B14F-4D97-AF65-F5344CB8AC3E}">
@@ -5859,7 +6039,7 @@
                 <a:latin typeface="Helvetica"/>
                 <a:cs typeface="Helvetica"/>
               </a:rPr>
-              <a:t>Gliederung</a:t>
+              <a:t>Zusammenfassung</a:t>
             </a:r>
             <a:endParaRPr lang="de-DE" sz="2800" dirty="0">
               <a:latin typeface="Helvetica"/>
@@ -5868,10 +6048,399 @@
           </a:p>
         </p:txBody>
       </p:sp>
+      <p:sp>
+        <p:nvSpPr>
+          <p:cNvPr id="6" name="Content Placeholder 5"/>
+          <p:cNvSpPr>
+            <a:spLocks noGrp="1"/>
+          </p:cNvSpPr>
+          <p:nvPr>
+            <p:ph idx="1"/>
+          </p:nvPr>
+        </p:nvSpPr>
+        <p:spPr/>
+        <p:txBody>
+          <a:bodyPr/>
+          <a:lstStyle/>
+          <a:p>
+            <a:r>
+              <a:rPr lang="en-US" dirty="0" err="1" smtClean="0"/>
+              <a:t>Erfahrungen</a:t>
+            </a:r>
+            <a:r>
+              <a:rPr lang="en-US" dirty="0" smtClean="0"/>
+              <a:t> </a:t>
+            </a:r>
+            <a:r>
+              <a:rPr lang="en-US" dirty="0" err="1" smtClean="0"/>
+              <a:t>sammeln</a:t>
+            </a:r>
+            <a:r>
+              <a:rPr lang="en-US" dirty="0" smtClean="0"/>
+              <a:t>:</a:t>
+            </a:r>
+          </a:p>
+          <a:p>
+            <a:pPr lvl="1"/>
+            <a:endParaRPr lang="en-US" dirty="0" smtClean="0"/>
+          </a:p>
+          <a:p>
+            <a:pPr lvl="1"/>
+            <a:r>
+              <a:rPr lang="en-US" dirty="0" err="1" smtClean="0"/>
+              <a:t>IntelliJ</a:t>
+            </a:r>
+            <a:endParaRPr lang="en-US" dirty="0" smtClean="0"/>
+          </a:p>
+          <a:p>
+            <a:pPr lvl="1"/>
+            <a:r>
+              <a:rPr lang="en-US" dirty="0" err="1" smtClean="0"/>
+              <a:t>Gradle</a:t>
+            </a:r>
+            <a:endParaRPr lang="en-US" dirty="0" smtClean="0"/>
+          </a:p>
+          <a:p>
+            <a:pPr lvl="1"/>
+            <a:r>
+              <a:rPr lang="en-US" dirty="0" smtClean="0"/>
+              <a:t>JSP</a:t>
+            </a:r>
+          </a:p>
+          <a:p>
+            <a:pPr lvl="1"/>
+            <a:r>
+              <a:rPr lang="en-US" dirty="0" smtClean="0"/>
+              <a:t>Hibernate</a:t>
+            </a:r>
+          </a:p>
+          <a:p>
+            <a:pPr lvl="1"/>
+            <a:r>
+              <a:rPr lang="en-US" dirty="0" err="1" smtClean="0"/>
+              <a:t>Datenbanken</a:t>
+            </a:r>
+            <a:endParaRPr lang="en-US" dirty="0" smtClean="0"/>
+          </a:p>
+          <a:p>
+            <a:pPr lvl="1"/>
+            <a:endParaRPr lang="en-US" dirty="0" smtClean="0"/>
+          </a:p>
+          <a:p>
+            <a:pPr marL="457200" lvl="1" indent="0">
+              <a:buNone/>
+            </a:pPr>
+            <a:endParaRPr lang="en-US" dirty="0"/>
+          </a:p>
+        </p:txBody>
+      </p:sp>
     </p:spTree>
     <p:extLst>
       <p:ext uri="{BB962C8B-B14F-4D97-AF65-F5344CB8AC3E}">
         <p14:creationId xmlns:p14="http://schemas.microsoft.com/office/powerpoint/2010/main" val="2821605111"/>
+      </p:ext>
+    </p:extLst>
+  </p:cSld>
+  <p:clrMapOvr>
+    <a:masterClrMapping/>
+  </p:clrMapOvr>
+</p:sld>
+</file>
+
+<file path=ppt/slides/slide8.xml><?xml version="1.0" encoding="utf-8"?>
+<p:sld xmlns:a="http://schemas.openxmlformats.org/drawingml/2006/main" xmlns:r="http://schemas.openxmlformats.org/officeDocument/2006/relationships" xmlns:p="http://schemas.openxmlformats.org/presentationml/2006/main">
+  <p:cSld>
+    <p:spTree>
+      <p:nvGrpSpPr>
+        <p:cNvPr id="1" name=""/>
+        <p:cNvGrpSpPr/>
+        <p:nvPr/>
+      </p:nvGrpSpPr>
+      <p:grpSpPr>
+        <a:xfrm>
+          <a:off x="0" y="0"/>
+          <a:ext cx="0" cy="0"/>
+          <a:chOff x="0" y="0"/>
+          <a:chExt cx="0" cy="0"/>
+        </a:xfrm>
+      </p:grpSpPr>
+      <p:sp>
+        <p:nvSpPr>
+          <p:cNvPr id="10" name="Textfeld 9"/>
+          <p:cNvSpPr txBox="1"/>
+          <p:nvPr/>
+        </p:nvSpPr>
+        <p:spPr>
+          <a:xfrm>
+            <a:off x="4561840" y="5252720"/>
+            <a:ext cx="184666" cy="369332"/>
+          </a:xfrm>
+          <a:prstGeom prst="rect">
+            <a:avLst/>
+          </a:prstGeom>
+          <a:noFill/>
+        </p:spPr>
+        <p:txBody>
+          <a:bodyPr wrap="none" rtlCol="0">
+            <a:spAutoFit/>
+          </a:bodyPr>
+          <a:lstStyle/>
+          <a:p>
+            <a:endParaRPr lang="de-DE" dirty="0"/>
+          </a:p>
+        </p:txBody>
+      </p:sp>
+      <p:pic>
+        <p:nvPicPr>
+          <p:cNvPr id="2" name="Bild 1" descr="logoDatenbankMitHSB.png"/>
+          <p:cNvPicPr>
+            <a:picLocks noChangeAspect="1"/>
+          </p:cNvPicPr>
+          <p:nvPr/>
+        </p:nvPicPr>
+        <p:blipFill>
+          <a:blip r:embed="rId3">
+            <a:extLst>
+              <a:ext uri="{28A0092B-C50C-407E-A947-70E740481C1C}">
+                <a14:useLocalDpi xmlns:a14="http://schemas.microsoft.com/office/drawing/2010/main" val="0"/>
+              </a:ext>
+            </a:extLst>
+          </a:blip>
+          <a:stretch>
+            <a:fillRect/>
+          </a:stretch>
+        </p:blipFill>
+        <p:spPr>
+          <a:xfrm>
+            <a:off x="6419279" y="215531"/>
+            <a:ext cx="2526288" cy="757233"/>
+          </a:xfrm>
+          <a:prstGeom prst="rect">
+            <a:avLst/>
+          </a:prstGeom>
+        </p:spPr>
+      </p:pic>
+      <p:sp>
+        <p:nvSpPr>
+          <p:cNvPr id="3" name="Textfeld 2"/>
+          <p:cNvSpPr txBox="1"/>
+          <p:nvPr/>
+        </p:nvSpPr>
+        <p:spPr>
+          <a:xfrm>
+            <a:off x="109137" y="6518200"/>
+            <a:ext cx="5050097" cy="246221"/>
+          </a:xfrm>
+          <a:prstGeom prst="rect">
+            <a:avLst/>
+          </a:prstGeom>
+          <a:noFill/>
+        </p:spPr>
+        <p:txBody>
+          <a:bodyPr wrap="square" rtlCol="0">
+            <a:spAutoFit/>
+          </a:bodyPr>
+          <a:lstStyle/>
+          <a:p>
+            <a:r>
+              <a:rPr lang="de-DE" sz="1000" dirty="0" smtClean="0">
+                <a:latin typeface="Helvetica"/>
+                <a:cs typeface="Helvetica"/>
+              </a:rPr>
+              <a:t>Datenbankbasierte Web-Anwendungen (</a:t>
+            </a:r>
+            <a:r>
+              <a:rPr lang="de-DE" sz="1000" dirty="0" err="1" smtClean="0">
+                <a:latin typeface="Helvetica"/>
+                <a:cs typeface="Helvetica"/>
+              </a:rPr>
+              <a:t>SoSe</a:t>
+            </a:r>
+            <a:r>
+              <a:rPr lang="de-DE" sz="1000" dirty="0" smtClean="0">
+                <a:latin typeface="Helvetica"/>
+                <a:cs typeface="Helvetica"/>
+              </a:rPr>
+              <a:t> 15)			Gruppe 09</a:t>
+            </a:r>
+            <a:endParaRPr lang="de-DE" sz="1000" dirty="0">
+              <a:latin typeface="Helvetica"/>
+              <a:cs typeface="Helvetica"/>
+            </a:endParaRPr>
+          </a:p>
+        </p:txBody>
+      </p:sp>
+      <p:sp>
+        <p:nvSpPr>
+          <p:cNvPr id="8" name="Textfeld 7"/>
+          <p:cNvSpPr txBox="1"/>
+          <p:nvPr/>
+        </p:nvSpPr>
+        <p:spPr>
+          <a:xfrm>
+            <a:off x="8375993" y="6518200"/>
+            <a:ext cx="569574" cy="246221"/>
+          </a:xfrm>
+          <a:prstGeom prst="rect">
+            <a:avLst/>
+          </a:prstGeom>
+          <a:noFill/>
+        </p:spPr>
+        <p:txBody>
+          <a:bodyPr wrap="none" rtlCol="0">
+            <a:spAutoFit/>
+          </a:bodyPr>
+          <a:lstStyle/>
+          <a:p>
+            <a:r>
+              <a:rPr lang="de-DE" sz="1000" dirty="0" smtClean="0">
+                <a:latin typeface="Helvetica"/>
+                <a:cs typeface="Helvetica"/>
+              </a:rPr>
+              <a:t>Folie </a:t>
+            </a:r>
+            <a:fld id="{80772B1C-95EE-FF4C-9138-2FEA01DFD2C9}" type="slidenum">
+              <a:rPr lang="de-DE" sz="1000" smtClean="0">
+                <a:latin typeface="Helvetica"/>
+                <a:cs typeface="Helvetica"/>
+              </a:rPr>
+              <a:t>8</a:t>
+            </a:fld>
+            <a:endParaRPr lang="de-DE" sz="1000" dirty="0">
+              <a:latin typeface="Helvetica"/>
+              <a:cs typeface="Helvetica"/>
+            </a:endParaRPr>
+          </a:p>
+        </p:txBody>
+      </p:sp>
+      <p:sp>
+        <p:nvSpPr>
+          <p:cNvPr id="11" name="Textfeld 10"/>
+          <p:cNvSpPr txBox="1"/>
+          <p:nvPr/>
+        </p:nvSpPr>
+        <p:spPr>
+          <a:xfrm>
+            <a:off x="109136" y="215531"/>
+            <a:ext cx="5788821" cy="523220"/>
+          </a:xfrm>
+          <a:prstGeom prst="rect">
+            <a:avLst/>
+          </a:prstGeom>
+          <a:noFill/>
+        </p:spPr>
+        <p:txBody>
+          <a:bodyPr wrap="square" rtlCol="0">
+            <a:spAutoFit/>
+          </a:bodyPr>
+          <a:lstStyle/>
+          <a:p>
+            <a:r>
+              <a:rPr lang="de-DE" sz="2800" dirty="0" smtClean="0">
+                <a:latin typeface="Helvetica"/>
+                <a:cs typeface="Helvetica"/>
+              </a:rPr>
+              <a:t>Fazit</a:t>
+            </a:r>
+            <a:endParaRPr lang="de-DE" sz="2800" dirty="0">
+              <a:latin typeface="Helvetica"/>
+              <a:cs typeface="Helvetica"/>
+            </a:endParaRPr>
+          </a:p>
+        </p:txBody>
+      </p:sp>
+      <p:sp>
+        <p:nvSpPr>
+          <p:cNvPr id="6" name="Content Placeholder 5"/>
+          <p:cNvSpPr>
+            <a:spLocks noGrp="1"/>
+          </p:cNvSpPr>
+          <p:nvPr>
+            <p:ph idx="1"/>
+          </p:nvPr>
+        </p:nvSpPr>
+        <p:spPr/>
+        <p:txBody>
+          <a:bodyPr/>
+          <a:lstStyle/>
+          <a:p>
+            <a:pPr marL="457200" lvl="1" indent="0">
+              <a:buNone/>
+            </a:pPr>
+            <a:endParaRPr lang="en-US" dirty="0" smtClean="0"/>
+          </a:p>
+          <a:p>
+            <a:pPr marL="457200" lvl="1" indent="0">
+              <a:buNone/>
+            </a:pPr>
+            <a:r>
+              <a:rPr lang="en-US" dirty="0" smtClean="0"/>
+              <a:t>-</a:t>
+            </a:r>
+            <a:r>
+              <a:rPr lang="en-US" dirty="0" err="1" smtClean="0"/>
+              <a:t>Gruppengröße</a:t>
+            </a:r>
+            <a:r>
+              <a:rPr lang="en-US" dirty="0" smtClean="0"/>
+              <a:t> </a:t>
+            </a:r>
+            <a:r>
+              <a:rPr lang="en-US" dirty="0" err="1" smtClean="0"/>
+              <a:t>schwer</a:t>
+            </a:r>
+            <a:r>
+              <a:rPr lang="en-US" dirty="0" smtClean="0"/>
+              <a:t> </a:t>
+            </a:r>
+            <a:r>
+              <a:rPr lang="en-US" dirty="0" err="1" smtClean="0"/>
+              <a:t>zu</a:t>
+            </a:r>
+            <a:r>
+              <a:rPr lang="en-US" dirty="0" smtClean="0"/>
+              <a:t> </a:t>
+            </a:r>
+            <a:r>
+              <a:rPr lang="en-US" dirty="0" err="1" smtClean="0"/>
+              <a:t>vereinbaren</a:t>
+            </a:r>
+            <a:endParaRPr lang="en-US" dirty="0" smtClean="0"/>
+          </a:p>
+          <a:p>
+            <a:pPr marL="457200" lvl="1" indent="0">
+              <a:buNone/>
+            </a:pPr>
+            <a:r>
+              <a:rPr lang="en-US" dirty="0" smtClean="0"/>
+              <a:t>-</a:t>
+            </a:r>
+            <a:r>
+              <a:rPr lang="en-US" dirty="0" err="1" smtClean="0"/>
+              <a:t>tolles</a:t>
+            </a:r>
+            <a:r>
+              <a:rPr lang="en-US" dirty="0" smtClean="0"/>
+              <a:t> </a:t>
+            </a:r>
+            <a:r>
+              <a:rPr lang="en-US" dirty="0" err="1" smtClean="0"/>
+              <a:t>Produkt</a:t>
+            </a:r>
+            <a:endParaRPr lang="en-US" smtClean="0"/>
+          </a:p>
+          <a:p>
+            <a:pPr marL="457200" lvl="1" indent="0">
+              <a:buNone/>
+            </a:pPr>
+            <a:endParaRPr lang="en-US" dirty="0"/>
+          </a:p>
+        </p:txBody>
+      </p:sp>
+    </p:spTree>
+    <p:extLst>
+      <p:ext uri="{BB962C8B-B14F-4D97-AF65-F5344CB8AC3E}">
+        <p14:creationId xmlns:p14="http://schemas.microsoft.com/office/powerpoint/2010/main" val="2080749278"/>
       </p:ext>
     </p:extLst>
   </p:cSld>

</xml_diff>